<commit_message>
added for2py architecture diagram
</commit_message>
<xml_diff>
--- a/documentation/deliverable_reports/m5_final_phase1_report/for2py-architecture.pptx
+++ b/documentation/deliverable_reports/m5_final_phase1_report/for2py-architecture.pptx
@@ -3856,7 +3856,7 @@
         <p:spPr>
           <a:xfrm flipV="1">
             <a:off x="1223911" y="1455379"/>
-            <a:ext cx="1725802" cy="1"/>
+            <a:ext cx="1563624" cy="1"/>
           </a:xfrm>
           <a:prstGeom prst="line">
             <a:avLst/>
@@ -3890,7 +3890,7 @@
         </p:nvSpPr>
         <p:spPr>
           <a:xfrm>
-            <a:off x="2943398" y="937785"/>
+            <a:off x="2779776" y="937785"/>
             <a:ext cx="257693" cy="517594"/>
           </a:xfrm>
           <a:custGeom>

</xml_diff>

<commit_message>
tweaked for2py architecture diagram
</commit_message>
<xml_diff>
--- a/documentation/deliverable_reports/m5_final_phase1_report/for2py-architecture.pptx
+++ b/documentation/deliverable_reports/m5_final_phase1_report/for2py-architecture.pptx
@@ -2983,7 +2983,7 @@
             <a:avLst/>
           </a:prstGeom>
           <a:noFill/>
-          <a:ln>
+          <a:ln w="3175">
             <a:solidFill>
               <a:schemeClr val="tx1"/>
             </a:solidFill>
@@ -3056,7 +3056,7 @@
               <a:schemeClr val="bg1"/>
             </a:bgClr>
           </a:pattFill>
-          <a:ln>
+          <a:ln w="3175">
             <a:solidFill>
               <a:schemeClr val="tx1"/>
             </a:solidFill>
@@ -3153,7 +3153,7 @@
             <a:avLst/>
           </a:prstGeom>
           <a:noFill/>
-          <a:ln>
+          <a:ln w="3175">
             <a:solidFill>
               <a:schemeClr val="tx1"/>
             </a:solidFill>
@@ -3216,7 +3216,7 @@
             <a:avLst/>
           </a:prstGeom>
           <a:noFill/>
-          <a:ln>
+          <a:ln w="3175">
             <a:solidFill>
               <a:schemeClr val="tx1"/>
             </a:solidFill>
@@ -3279,7 +3279,7 @@
             <a:avLst/>
           </a:prstGeom>
           <a:noFill/>
-          <a:ln>
+          <a:ln w="3175">
             <a:solidFill>
               <a:schemeClr val="tx1"/>
             </a:solidFill>
@@ -3342,7 +3342,7 @@
             <a:avLst/>
           </a:prstGeom>
           <a:noFill/>
-          <a:ln>
+          <a:ln w="3175">
             <a:solidFill>
               <a:schemeClr val="tx1"/>
             </a:solidFill>
@@ -3423,11 +3423,11 @@
           <a:prstGeom prst="straightConnector1">
             <a:avLst/>
           </a:prstGeom>
-          <a:ln>
+          <a:ln w="3175">
             <a:solidFill>
               <a:schemeClr val="tx1"/>
             </a:solidFill>
-            <a:tailEnd type="triangle"/>
+            <a:tailEnd type="triangle" w="sm" len="med"/>
           </a:ln>
         </p:spPr>
         <p:style>
@@ -3462,11 +3462,11 @@
           <a:prstGeom prst="straightConnector1">
             <a:avLst/>
           </a:prstGeom>
-          <a:ln>
+          <a:ln w="3175">
             <a:solidFill>
               <a:schemeClr val="tx1"/>
             </a:solidFill>
-            <a:tailEnd type="triangle"/>
+            <a:tailEnd type="triangle" w="sm" len="med"/>
           </a:ln>
         </p:spPr>
         <p:style>
@@ -3505,7 +3505,7 @@
             <a:solidFill>
               <a:schemeClr val="tx1"/>
             </a:solidFill>
-            <a:tailEnd type="triangle"/>
+            <a:tailEnd type="triangle" w="sm" len="med"/>
           </a:ln>
         </p:spPr>
         <p:style>
@@ -3540,11 +3540,11 @@
           <a:prstGeom prst="straightConnector1">
             <a:avLst/>
           </a:prstGeom>
-          <a:ln>
+          <a:ln w="3175">
             <a:solidFill>
               <a:schemeClr val="tx1"/>
             </a:solidFill>
-            <a:tailEnd type="triangle"/>
+            <a:tailEnd type="triangle" w="sm" len="med"/>
           </a:ln>
         </p:spPr>
         <p:style>
@@ -3579,11 +3579,11 @@
           <a:prstGeom prst="straightConnector1">
             <a:avLst/>
           </a:prstGeom>
-          <a:ln>
+          <a:ln w="3175">
             <a:solidFill>
               <a:schemeClr val="tx1"/>
             </a:solidFill>
-            <a:tailEnd type="triangle"/>
+            <a:tailEnd type="triangle" w="sm" len="med"/>
           </a:ln>
         </p:spPr>
         <p:style>
@@ -3616,7 +3616,7 @@
             <a:avLst/>
           </a:prstGeom>
           <a:noFill/>
-          <a:ln>
+          <a:ln w="3175">
             <a:solidFill>
               <a:schemeClr val="tx1"/>
             </a:solidFill>
@@ -3728,11 +3728,11 @@
           <a:prstGeom prst="straightConnector1">
             <a:avLst/>
           </a:prstGeom>
-          <a:ln>
+          <a:ln w="3175">
             <a:solidFill>
               <a:schemeClr val="tx1"/>
             </a:solidFill>
-            <a:tailEnd type="triangle"/>
+            <a:tailEnd type="triangle" w="sm" len="med"/>
           </a:ln>
         </p:spPr>
         <p:style>
@@ -3813,11 +3813,11 @@
             </a:pathLst>
           </a:custGeom>
           <a:noFill/>
-          <a:ln w="6350">
+          <a:ln w="3175">
             <a:solidFill>
               <a:schemeClr val="tx1"/>
             </a:solidFill>
-            <a:tailEnd type="triangle" w="med" len="med"/>
+            <a:tailEnd type="triangle" w="sm" len="med"/>
           </a:ln>
         </p:spPr>
         <p:style>
@@ -3861,7 +3861,7 @@
           <a:prstGeom prst="line">
             <a:avLst/>
           </a:prstGeom>
-          <a:ln w="6350">
+          <a:ln w="3175">
             <a:solidFill>
               <a:schemeClr val="tx1"/>
             </a:solidFill>
@@ -3945,11 +3945,11 @@
             </a:pathLst>
           </a:custGeom>
           <a:noFill/>
-          <a:ln w="6350">
+          <a:ln w="3175">
             <a:solidFill>
               <a:schemeClr val="tx1"/>
             </a:solidFill>
-            <a:tailEnd type="triangle"/>
+            <a:tailEnd type="triangle" w="sm" len="med"/>
           </a:ln>
         </p:spPr>
         <p:style>
@@ -4070,7 +4070,7 @@
           <a:prstGeom prst="line">
             <a:avLst/>
           </a:prstGeom>
-          <a:ln>
+          <a:ln w="3175">
             <a:solidFill>
               <a:schemeClr val="bg1">
                 <a:lumMod val="75000"/>
@@ -4140,7 +4140,7 @@
           <a:prstGeom prst="line">
             <a:avLst/>
           </a:prstGeom>
-          <a:ln>
+          <a:ln w="3175">
             <a:solidFill>
               <a:schemeClr val="bg1">
                 <a:lumMod val="75000"/>
@@ -4210,12 +4210,13 @@
           <a:prstGeom prst="line">
             <a:avLst/>
           </a:prstGeom>
-          <a:ln>
+          <a:ln w="3175">
             <a:solidFill>
               <a:schemeClr val="bg1">
                 <a:lumMod val="75000"/>
               </a:schemeClr>
             </a:solidFill>
+            <a:tailEnd w="sm" len="med"/>
           </a:ln>
         </p:spPr>
         <p:style>
@@ -4287,7 +4288,7 @@
           <a:prstGeom prst="line">
             <a:avLst/>
           </a:prstGeom>
-          <a:ln>
+          <a:ln w="3175">
             <a:solidFill>
               <a:schemeClr val="bg1">
                 <a:lumMod val="75000"/>
@@ -4363,7 +4364,7 @@
           <a:prstGeom prst="line">
             <a:avLst/>
           </a:prstGeom>
-          <a:ln>
+          <a:ln w="3175">
             <a:solidFill>
               <a:schemeClr val="bg1">
                 <a:lumMod val="75000"/>
@@ -4400,11 +4401,11 @@
           <a:prstGeom prst="straightConnector1">
             <a:avLst/>
           </a:prstGeom>
-          <a:ln>
+          <a:ln w="3175">
             <a:solidFill>
               <a:schemeClr val="tx1"/>
             </a:solidFill>
-            <a:tailEnd type="triangle"/>
+            <a:tailEnd type="triangle" w="sm" len="med"/>
           </a:ln>
         </p:spPr>
         <p:style>
@@ -4436,11 +4437,11 @@
           <a:prstGeom prst="straightConnector1">
             <a:avLst/>
           </a:prstGeom>
-          <a:ln>
+          <a:ln w="3175">
             <a:solidFill>
               <a:schemeClr val="tx1"/>
             </a:solidFill>
-            <a:tailEnd type="triangle"/>
+            <a:tailEnd type="triangle" w="sm" len="med"/>
           </a:ln>
         </p:spPr>
         <p:style>
@@ -4514,6 +4515,105 @@
               <a:rPr lang="en-US" sz="1000" dirty="0" smtClean="0"/>
               <a:t>lambdas</a:t>
             </a:r>
+          </a:p>
+        </p:txBody>
+      </p:sp>
+      <p:sp>
+        <p:nvSpPr>
+          <p:cNvPr id="136" name="Rectangle 135"/>
+          <p:cNvSpPr/>
+          <p:nvPr/>
+        </p:nvSpPr>
+        <p:spPr>
+          <a:xfrm>
+            <a:off x="3591425" y="1447235"/>
+            <a:ext cx="324083" cy="198927"/>
+          </a:xfrm>
+          <a:prstGeom prst="rect">
+            <a:avLst/>
+          </a:prstGeom>
+          <a:pattFill prst="ltUpDiag">
+            <a:fgClr>
+              <a:schemeClr val="accent1">
+                <a:lumMod val="40000"/>
+                <a:lumOff val="60000"/>
+              </a:schemeClr>
+            </a:fgClr>
+            <a:bgClr>
+              <a:schemeClr val="bg1"/>
+            </a:bgClr>
+          </a:pattFill>
+          <a:ln w="3175">
+            <a:solidFill>
+              <a:schemeClr val="tx1"/>
+            </a:solidFill>
+          </a:ln>
+        </p:spPr>
+        <p:style>
+          <a:lnRef idx="2">
+            <a:schemeClr val="accent1">
+              <a:shade val="50000"/>
+            </a:schemeClr>
+          </a:lnRef>
+          <a:fillRef idx="1">
+            <a:schemeClr val="accent1"/>
+          </a:fillRef>
+          <a:effectRef idx="0">
+            <a:schemeClr val="accent1"/>
+          </a:effectRef>
+          <a:fontRef idx="minor">
+            <a:schemeClr val="lt1"/>
+          </a:fontRef>
+        </p:style>
+        <p:txBody>
+          <a:bodyPr rot="0" spcFirstLastPara="0" vertOverflow="overflow" horzOverflow="overflow" vert="horz" wrap="square" lIns="9144" tIns="49530" rIns="9144" bIns="49530" numCol="1" spcCol="0" rtlCol="0" fromWordArt="0" anchor="ctr" anchorCtr="0" forceAA="0" compatLnSpc="1">
+            <a:prstTxWarp prst="textNoShape">
+              <a:avLst/>
+            </a:prstTxWarp>
+            <a:noAutofit/>
+          </a:bodyPr>
+          <a:lstStyle/>
+          <a:p>
+            <a:pPr algn="ctr">
+              <a:lnSpc>
+                <a:spcPts val="900"/>
+              </a:lnSpc>
+            </a:pPr>
+            <a:endParaRPr lang="en-US" sz="850" dirty="0">
+              <a:solidFill>
+                <a:schemeClr val="tx1"/>
+              </a:solidFill>
+            </a:endParaRPr>
+          </a:p>
+        </p:txBody>
+      </p:sp>
+      <p:sp>
+        <p:nvSpPr>
+          <p:cNvPr id="137" name="TextBox 136"/>
+          <p:cNvSpPr txBox="1"/>
+          <p:nvPr/>
+        </p:nvSpPr>
+        <p:spPr>
+          <a:xfrm>
+            <a:off x="3879267" y="1447235"/>
+            <a:ext cx="1064715" cy="207749"/>
+          </a:xfrm>
+          <a:prstGeom prst="rect">
+            <a:avLst/>
+          </a:prstGeom>
+          <a:noFill/>
+        </p:spPr>
+        <p:txBody>
+          <a:bodyPr wrap="none" rtlCol="0">
+            <a:spAutoFit/>
+          </a:bodyPr>
+          <a:lstStyle/>
+          <a:p>
+            <a:r>
+              <a:rPr lang="en-US" sz="750" dirty="0" smtClean="0"/>
+              <a:t>:  Third-party software</a:t>
+            </a:r>
+            <a:endParaRPr lang="en-US" sz="750" dirty="0"/>
           </a:p>
         </p:txBody>
       </p:sp>

</xml_diff>

<commit_message>
removed references to AST rectification
</commit_message>
<xml_diff>
--- a/documentation/deliverable_reports/m5_final_phase1_report/for2py-architecture.pptx
+++ b/documentation/deliverable_reports/m5_final_phase1_report/for2py-architecture.pptx
@@ -243,7 +243,7 @@
           <a:p>
             <a:fld id="{5E551C00-9195-45AD-A55D-BDDF21724D49}" type="datetimeFigureOut">
               <a:rPr lang="en-US" smtClean="0"/>
-              <a:t>3/22/2019</a:t>
+              <a:t>3/27/2019</a:t>
             </a:fld>
             <a:endParaRPr lang="en-US"/>
           </a:p>
@@ -413,7 +413,7 @@
           <a:p>
             <a:fld id="{5E551C00-9195-45AD-A55D-BDDF21724D49}" type="datetimeFigureOut">
               <a:rPr lang="en-US" smtClean="0"/>
-              <a:t>3/22/2019</a:t>
+              <a:t>3/27/2019</a:t>
             </a:fld>
             <a:endParaRPr lang="en-US"/>
           </a:p>
@@ -593,7 +593,7 @@
           <a:p>
             <a:fld id="{5E551C00-9195-45AD-A55D-BDDF21724D49}" type="datetimeFigureOut">
               <a:rPr lang="en-US" smtClean="0"/>
-              <a:t>3/22/2019</a:t>
+              <a:t>3/27/2019</a:t>
             </a:fld>
             <a:endParaRPr lang="en-US"/>
           </a:p>
@@ -763,7 +763,7 @@
           <a:p>
             <a:fld id="{5E551C00-9195-45AD-A55D-BDDF21724D49}" type="datetimeFigureOut">
               <a:rPr lang="en-US" smtClean="0"/>
-              <a:t>3/22/2019</a:t>
+              <a:t>3/27/2019</a:t>
             </a:fld>
             <a:endParaRPr lang="en-US"/>
           </a:p>
@@ -1009,7 +1009,7 @@
           <a:p>
             <a:fld id="{5E551C00-9195-45AD-A55D-BDDF21724D49}" type="datetimeFigureOut">
               <a:rPr lang="en-US" smtClean="0"/>
-              <a:t>3/22/2019</a:t>
+              <a:t>3/27/2019</a:t>
             </a:fld>
             <a:endParaRPr lang="en-US"/>
           </a:p>
@@ -1241,7 +1241,7 @@
           <a:p>
             <a:fld id="{5E551C00-9195-45AD-A55D-BDDF21724D49}" type="datetimeFigureOut">
               <a:rPr lang="en-US" smtClean="0"/>
-              <a:t>3/22/2019</a:t>
+              <a:t>3/27/2019</a:t>
             </a:fld>
             <a:endParaRPr lang="en-US"/>
           </a:p>
@@ -1608,7 +1608,7 @@
           <a:p>
             <a:fld id="{5E551C00-9195-45AD-A55D-BDDF21724D49}" type="datetimeFigureOut">
               <a:rPr lang="en-US" smtClean="0"/>
-              <a:t>3/22/2019</a:t>
+              <a:t>3/27/2019</a:t>
             </a:fld>
             <a:endParaRPr lang="en-US"/>
           </a:p>
@@ -1726,7 +1726,7 @@
           <a:p>
             <a:fld id="{5E551C00-9195-45AD-A55D-BDDF21724D49}" type="datetimeFigureOut">
               <a:rPr lang="en-US" smtClean="0"/>
-              <a:t>3/22/2019</a:t>
+              <a:t>3/27/2019</a:t>
             </a:fld>
             <a:endParaRPr lang="en-US"/>
           </a:p>
@@ -1821,7 +1821,7 @@
           <a:p>
             <a:fld id="{5E551C00-9195-45AD-A55D-BDDF21724D49}" type="datetimeFigureOut">
               <a:rPr lang="en-US" smtClean="0"/>
-              <a:t>3/22/2019</a:t>
+              <a:t>3/27/2019</a:t>
             </a:fld>
             <a:endParaRPr lang="en-US"/>
           </a:p>
@@ -2098,7 +2098,7 @@
           <a:p>
             <a:fld id="{5E551C00-9195-45AD-A55D-BDDF21724D49}" type="datetimeFigureOut">
               <a:rPr lang="en-US" smtClean="0"/>
-              <a:t>3/22/2019</a:t>
+              <a:t>3/27/2019</a:t>
             </a:fld>
             <a:endParaRPr lang="en-US"/>
           </a:p>
@@ -2355,7 +2355,7 @@
           <a:p>
             <a:fld id="{5E551C00-9195-45AD-A55D-BDDF21724D49}" type="datetimeFigureOut">
               <a:rPr lang="en-US" smtClean="0"/>
-              <a:t>3/22/2019</a:t>
+              <a:t>3/27/2019</a:t>
             </a:fld>
             <a:endParaRPr lang="en-US"/>
           </a:p>
@@ -2568,7 +2568,7 @@
           <a:p>
             <a:fld id="{5E551C00-9195-45AD-A55D-BDDF21724D49}" type="datetimeFigureOut">
               <a:rPr lang="en-US" smtClean="0"/>
-              <a:t>3/22/2019</a:t>
+              <a:t>3/27/2019</a:t>
             </a:fld>
             <a:endParaRPr lang="en-US"/>
           </a:p>
@@ -2981,7 +2981,7 @@
         </p:nvSpPr>
         <p:spPr>
           <a:xfrm>
-            <a:off x="611263" y="622075"/>
+            <a:off x="1041881" y="622075"/>
             <a:ext cx="612648" cy="381565"/>
           </a:xfrm>
           <a:prstGeom prst="rect">
@@ -3044,7 +3044,7 @@
         </p:nvSpPr>
         <p:spPr>
           <a:xfrm>
-            <a:off x="1420227" y="622075"/>
+            <a:off x="1850845" y="622075"/>
             <a:ext cx="612648" cy="381565"/>
           </a:xfrm>
           <a:prstGeom prst="rect">
@@ -3145,13 +3145,13 @@
       </p:sp>
       <p:sp>
         <p:nvSpPr>
-          <p:cNvPr id="14" name="Rectangle 13"/>
+          <p:cNvPr id="15" name="Rectangle 14"/>
           <p:cNvSpPr/>
           <p:nvPr/>
         </p:nvSpPr>
         <p:spPr>
           <a:xfrm>
-            <a:off x="2225820" y="625781"/>
+            <a:off x="2656438" y="622075"/>
             <a:ext cx="612648" cy="381565"/>
           </a:xfrm>
           <a:prstGeom prst="rect">
@@ -3196,7 +3196,7 @@
                   <a:schemeClr val="tx1"/>
                 </a:solidFill>
               </a:rPr>
-              <a:t>AST rectifier</a:t>
+              <a:t>AST transformer </a:t>
             </a:r>
             <a:endParaRPr lang="en-US" sz="850" dirty="0">
               <a:solidFill>
@@ -3208,13 +3208,13 @@
       </p:sp>
       <p:sp>
         <p:nvSpPr>
-          <p:cNvPr id="15" name="Rectangle 14"/>
+          <p:cNvPr id="16" name="Rectangle 15"/>
           <p:cNvSpPr/>
           <p:nvPr/>
         </p:nvSpPr>
         <p:spPr>
           <a:xfrm>
-            <a:off x="3029787" y="622075"/>
+            <a:off x="3467028" y="622075"/>
             <a:ext cx="612648" cy="381565"/>
           </a:xfrm>
           <a:prstGeom prst="rect">
@@ -3259,7 +3259,7 @@
                   <a:schemeClr val="tx1"/>
                 </a:solidFill>
               </a:rPr>
-              <a:t>AST transformer </a:t>
+              <a:t>AST to IR lifter </a:t>
             </a:r>
             <a:endParaRPr lang="en-US" sz="850" dirty="0">
               <a:solidFill>
@@ -3271,13 +3271,13 @@
       </p:sp>
       <p:sp>
         <p:nvSpPr>
-          <p:cNvPr id="16" name="Rectangle 15"/>
+          <p:cNvPr id="17" name="Rectangle 16"/>
           <p:cNvSpPr/>
           <p:nvPr/>
         </p:nvSpPr>
         <p:spPr>
           <a:xfrm>
-            <a:off x="3840377" y="622075"/>
+            <a:off x="4281897" y="622075"/>
             <a:ext cx="612648" cy="381565"/>
           </a:xfrm>
           <a:prstGeom prst="rect">
@@ -3322,69 +3322,6 @@
                   <a:schemeClr val="tx1"/>
                 </a:solidFill>
               </a:rPr>
-              <a:t>AST to IR lifter </a:t>
-            </a:r>
-            <a:endParaRPr lang="en-US" sz="850" dirty="0">
-              <a:solidFill>
-                <a:schemeClr val="tx1"/>
-              </a:solidFill>
-            </a:endParaRPr>
-          </a:p>
-        </p:txBody>
-      </p:sp>
-      <p:sp>
-        <p:nvSpPr>
-          <p:cNvPr id="17" name="Rectangle 16"/>
-          <p:cNvSpPr/>
-          <p:nvPr/>
-        </p:nvSpPr>
-        <p:spPr>
-          <a:xfrm>
-            <a:off x="4655246" y="622075"/>
-            <a:ext cx="612648" cy="381565"/>
-          </a:xfrm>
-          <a:prstGeom prst="rect">
-            <a:avLst/>
-          </a:prstGeom>
-          <a:noFill/>
-          <a:ln w="3175">
-            <a:solidFill>
-              <a:schemeClr val="tx1"/>
-            </a:solidFill>
-          </a:ln>
-        </p:spPr>
-        <p:style>
-          <a:lnRef idx="2">
-            <a:schemeClr val="accent1">
-              <a:shade val="50000"/>
-            </a:schemeClr>
-          </a:lnRef>
-          <a:fillRef idx="1">
-            <a:schemeClr val="accent1"/>
-          </a:fillRef>
-          <a:effectRef idx="0">
-            <a:schemeClr val="accent1"/>
-          </a:effectRef>
-          <a:fontRef idx="minor">
-            <a:schemeClr val="lt1"/>
-          </a:fontRef>
-        </p:style>
-        <p:txBody>
-          <a:bodyPr rot="0" spcFirstLastPara="0" vertOverflow="overflow" horzOverflow="overflow" vert="horz" wrap="square" lIns="9144" tIns="49530" rIns="9144" bIns="49530" numCol="1" spcCol="0" rtlCol="0" fromWordArt="0" anchor="ctr" anchorCtr="0" forceAA="0" compatLnSpc="1">
-            <a:prstTxWarp prst="textNoShape">
-              <a:avLst/>
-            </a:prstTxWarp>
-            <a:noAutofit/>
-          </a:bodyPr>
-          <a:lstStyle/>
-          <a:p>
-            <a:pPr algn="ctr"/>
-            <a:r>
-              <a:rPr lang="en-US" sz="850" dirty="0" smtClean="0">
-                <a:solidFill>
-                  <a:schemeClr val="tx1"/>
-                </a:solidFill>
-              </a:rPr>
               <a:t>IR to </a:t>
             </a:r>
             <a:r>
@@ -3422,7 +3359,7 @@
         </p:nvCxnSpPr>
         <p:spPr>
           <a:xfrm>
-            <a:off x="1223911" y="812858"/>
+            <a:off x="1654529" y="812858"/>
             <a:ext cx="196316" cy="0"/>
           </a:xfrm>
           <a:prstGeom prst="straightConnector1">
@@ -3461,7 +3398,7 @@
         </p:nvCxnSpPr>
         <p:spPr>
           <a:xfrm>
-            <a:off x="4453025" y="812858"/>
+            <a:off x="4079676" y="812858"/>
             <a:ext cx="202221" cy="0"/>
           </a:xfrm>
           <a:prstGeom prst="straightConnector1">
@@ -3500,52 +3437,13 @@
         </p:nvCxnSpPr>
         <p:spPr>
           <a:xfrm>
-            <a:off x="3642435" y="812858"/>
+            <a:off x="3269086" y="812858"/>
             <a:ext cx="197942" cy="0"/>
           </a:xfrm>
           <a:prstGeom prst="straightConnector1">
             <a:avLst/>
           </a:prstGeom>
           <a:ln>
-            <a:solidFill>
-              <a:schemeClr val="tx1"/>
-            </a:solidFill>
-            <a:tailEnd type="triangle" w="sm" len="med"/>
-          </a:ln>
-        </p:spPr>
-        <p:style>
-          <a:lnRef idx="1">
-            <a:schemeClr val="accent1"/>
-          </a:lnRef>
-          <a:fillRef idx="0">
-            <a:schemeClr val="accent1"/>
-          </a:fillRef>
-          <a:effectRef idx="0">
-            <a:schemeClr val="accent1"/>
-          </a:effectRef>
-          <a:fontRef idx="minor">
-            <a:schemeClr val="tx1"/>
-          </a:fontRef>
-        </p:style>
-      </p:cxnSp>
-      <p:cxnSp>
-        <p:nvCxnSpPr>
-          <p:cNvPr id="24" name="Straight Arrow Connector 23"/>
-          <p:cNvCxnSpPr>
-            <a:stCxn id="14" idx="3"/>
-            <a:endCxn id="15" idx="1"/>
-          </p:cNvCxnSpPr>
-          <p:nvPr/>
-        </p:nvCxnSpPr>
-        <p:spPr>
-          <a:xfrm flipV="1">
-            <a:off x="2838468" y="812858"/>
-            <a:ext cx="191319" cy="3706"/>
-          </a:xfrm>
-          <a:prstGeom prst="straightConnector1">
-            <a:avLst/>
-          </a:prstGeom>
-          <a:ln w="3175">
             <a:solidFill>
               <a:schemeClr val="tx1"/>
             </a:solidFill>
@@ -3572,13 +3470,12 @@
           <p:cNvPr id="25" name="Straight Arrow Connector 24"/>
           <p:cNvCxnSpPr>
             <a:stCxn id="13" idx="3"/>
-            <a:endCxn id="14" idx="1"/>
           </p:cNvCxnSpPr>
           <p:nvPr/>
         </p:nvCxnSpPr>
         <p:spPr>
           <a:xfrm>
-            <a:off x="2032875" y="812858"/>
+            <a:off x="2463493" y="812858"/>
             <a:ext cx="192945" cy="3706"/>
           </a:xfrm>
           <a:prstGeom prst="straightConnector1">
@@ -3614,7 +3511,7 @@
         </p:nvSpPr>
         <p:spPr>
           <a:xfrm>
-            <a:off x="611263" y="1264597"/>
+            <a:off x="1041881" y="1264597"/>
             <a:ext cx="612648" cy="381565"/>
           </a:xfrm>
           <a:prstGeom prst="rect">
@@ -3688,7 +3585,7 @@
         </p:nvSpPr>
         <p:spPr>
           <a:xfrm>
-            <a:off x="0" y="606686"/>
+            <a:off x="334657" y="603199"/>
             <a:ext cx="419877" cy="400110"/>
           </a:xfrm>
           <a:prstGeom prst="rect">
@@ -3727,8 +3624,8 @@
         </p:nvCxnSpPr>
         <p:spPr>
           <a:xfrm>
-            <a:off x="419877" y="806741"/>
-            <a:ext cx="191386" cy="6117"/>
+            <a:off x="754534" y="803254"/>
+            <a:ext cx="287347" cy="9604"/>
           </a:xfrm>
           <a:prstGeom prst="straightConnector1">
             <a:avLst/>
@@ -3763,8 +3660,8 @@
         </p:nvSpPr>
         <p:spPr>
           <a:xfrm>
-            <a:off x="421635" y="806741"/>
-            <a:ext cx="195943" cy="651386"/>
+            <a:off x="773287" y="803254"/>
+            <a:ext cx="274910" cy="654873"/>
           </a:xfrm>
           <a:custGeom>
             <a:avLst/>
@@ -3855,13 +3752,14 @@
           <p:cNvPr id="81" name="Straight Connector 80"/>
           <p:cNvCxnSpPr>
             <a:stCxn id="34" idx="3"/>
+            <a:endCxn id="86" idx="0"/>
           </p:cNvCxnSpPr>
           <p:nvPr/>
         </p:nvCxnSpPr>
         <p:spPr>
           <a:xfrm flipV="1">
-            <a:off x="1223911" y="1455379"/>
-            <a:ext cx="1563624" cy="1"/>
+            <a:off x="1654529" y="1451018"/>
+            <a:ext cx="744216" cy="4362"/>
           </a:xfrm>
           <a:prstGeom prst="line">
             <a:avLst/>
@@ -3895,7 +3793,7 @@
         </p:nvSpPr>
         <p:spPr>
           <a:xfrm>
-            <a:off x="2779776" y="937785"/>
+            <a:off x="2398745" y="933424"/>
             <a:ext cx="257693" cy="517594"/>
           </a:xfrm>
           <a:custGeom>
@@ -3990,7 +3888,7 @@
         </p:nvSpPr>
         <p:spPr>
           <a:xfrm>
-            <a:off x="1670720" y="1173490"/>
+            <a:off x="1637625" y="1161137"/>
             <a:ext cx="825868" cy="323165"/>
           </a:xfrm>
           <a:prstGeom prst="rect">
@@ -4028,7 +3926,7 @@
         </p:nvSpPr>
         <p:spPr>
           <a:xfrm>
-            <a:off x="1032525" y="261750"/>
+            <a:off x="1463143" y="261750"/>
             <a:ext cx="588633" cy="249299"/>
           </a:xfrm>
           <a:prstGeom prst="rect">
@@ -4045,11 +3943,7 @@
             <a:pPr algn="ctr"/>
             <a:r>
               <a:rPr lang="en-US" sz="750" dirty="0" smtClean="0"/>
-              <a:t>Preprocessed s</a:t>
-            </a:r>
-            <a:r>
-              <a:rPr lang="en-US" sz="750" dirty="0" smtClean="0"/>
-              <a:t>ource code</a:t>
+              <a:t>Preprocessed source code</a:t>
             </a:r>
           </a:p>
         </p:txBody>
@@ -4064,7 +3958,7 @@
         </p:nvCxnSpPr>
         <p:spPr>
           <a:xfrm flipV="1">
-            <a:off x="1302709" y="511049"/>
+            <a:off x="1733327" y="511049"/>
             <a:ext cx="24133" cy="303662"/>
           </a:xfrm>
           <a:prstGeom prst="line">
@@ -4101,7 +3995,7 @@
         </p:nvSpPr>
         <p:spPr>
           <a:xfrm>
-            <a:off x="1885702" y="258519"/>
+            <a:off x="2316320" y="258519"/>
             <a:ext cx="478016" cy="133883"/>
           </a:xfrm>
           <a:prstGeom prst="rect">
@@ -4134,7 +4028,7 @@
         </p:nvCxnSpPr>
         <p:spPr>
           <a:xfrm flipV="1">
-            <a:off x="2102218" y="392402"/>
+            <a:off x="2532836" y="392402"/>
             <a:ext cx="22492" cy="434500"/>
           </a:xfrm>
           <a:prstGeom prst="line">
@@ -4165,84 +4059,13 @@
       </p:cxnSp>
       <p:sp>
         <p:nvSpPr>
-          <p:cNvPr id="98" name="TextBox 97"/>
-          <p:cNvSpPr txBox="1"/>
-          <p:nvPr/>
-        </p:nvSpPr>
-        <p:spPr>
-          <a:xfrm>
-            <a:off x="2689669" y="261750"/>
-            <a:ext cx="478016" cy="133883"/>
-          </a:xfrm>
-          <a:prstGeom prst="rect">
-            <a:avLst/>
-          </a:prstGeom>
-          <a:noFill/>
-        </p:spPr>
-        <p:txBody>
-          <a:bodyPr wrap="square" lIns="9144" tIns="9144" rIns="9144" bIns="9144" rtlCol="0">
-            <a:spAutoFit/>
-          </a:bodyPr>
-          <a:lstStyle/>
-          <a:p>
-            <a:pPr algn="ctr"/>
-            <a:r>
-              <a:rPr lang="en-US" sz="750" dirty="0" smtClean="0"/>
-              <a:t>AST (XML)</a:t>
-            </a:r>
-            <a:endParaRPr lang="en-US" sz="750" dirty="0"/>
-          </a:p>
-        </p:txBody>
-      </p:sp>
-      <p:cxnSp>
-        <p:nvCxnSpPr>
-          <p:cNvPr id="99" name="Straight Connector 98"/>
-          <p:cNvCxnSpPr>
-            <a:endCxn id="98" idx="2"/>
-          </p:cNvCxnSpPr>
-          <p:nvPr/>
-        </p:nvCxnSpPr>
-        <p:spPr>
-          <a:xfrm flipV="1">
-            <a:off x="2906185" y="395633"/>
-            <a:ext cx="22492" cy="434500"/>
-          </a:xfrm>
-          <a:prstGeom prst="line">
-            <a:avLst/>
-          </a:prstGeom>
-          <a:ln w="3175">
-            <a:solidFill>
-              <a:schemeClr val="bg1">
-                <a:lumMod val="75000"/>
-              </a:schemeClr>
-            </a:solidFill>
-            <a:tailEnd w="sm" len="med"/>
-          </a:ln>
-        </p:spPr>
-        <p:style>
-          <a:lnRef idx="1">
-            <a:schemeClr val="accent1"/>
-          </a:lnRef>
-          <a:fillRef idx="0">
-            <a:schemeClr val="accent1"/>
-          </a:fillRef>
-          <a:effectRef idx="0">
-            <a:schemeClr val="accent1"/>
-          </a:effectRef>
-          <a:fontRef idx="minor">
-            <a:schemeClr val="tx1"/>
-          </a:fontRef>
-        </p:style>
-      </p:cxnSp>
-      <p:sp>
-        <p:nvSpPr>
           <p:cNvPr id="102" name="TextBox 101"/>
           <p:cNvSpPr txBox="1"/>
           <p:nvPr/>
         </p:nvSpPr>
         <p:spPr>
           <a:xfrm>
-            <a:off x="3350488" y="253297"/>
+            <a:off x="2977139" y="253297"/>
             <a:ext cx="786114" cy="249299"/>
           </a:xfrm>
           <a:prstGeom prst="rect">
@@ -4282,7 +4105,7 @@
         </p:nvCxnSpPr>
         <p:spPr>
           <a:xfrm flipV="1">
-            <a:off x="3705520" y="502596"/>
+            <a:off x="3332171" y="502596"/>
             <a:ext cx="38025" cy="310263"/>
           </a:xfrm>
           <a:prstGeom prst="line">
@@ -4319,7 +4142,7 @@
         </p:nvSpPr>
         <p:spPr>
           <a:xfrm>
-            <a:off x="4175456" y="253297"/>
+            <a:off x="3802107" y="253297"/>
             <a:ext cx="786114" cy="249299"/>
           </a:xfrm>
           <a:prstGeom prst="rect">
@@ -4358,7 +4181,7 @@
         </p:nvCxnSpPr>
         <p:spPr>
           <a:xfrm flipV="1">
-            <a:off x="4523413" y="502596"/>
+            <a:off x="4150064" y="502596"/>
             <a:ext cx="45100" cy="310261"/>
           </a:xfrm>
           <a:prstGeom prst="line">
@@ -4395,7 +4218,7 @@
         </p:nvCxnSpPr>
         <p:spPr>
           <a:xfrm>
-            <a:off x="5267894" y="702603"/>
+            <a:off x="4894545" y="702603"/>
             <a:ext cx="201662" cy="0"/>
           </a:xfrm>
           <a:prstGeom prst="straightConnector1">
@@ -4431,7 +4254,7 @@
         </p:nvCxnSpPr>
         <p:spPr>
           <a:xfrm>
-            <a:off x="5267894" y="933424"/>
+            <a:off x="4894545" y="933424"/>
             <a:ext cx="201662" cy="0"/>
           </a:xfrm>
           <a:prstGeom prst="straightConnector1">
@@ -4467,7 +4290,7 @@
         </p:nvSpPr>
         <p:spPr>
           <a:xfrm>
-            <a:off x="5515763" y="568490"/>
+            <a:off x="5142414" y="568490"/>
             <a:ext cx="364779" cy="246221"/>
           </a:xfrm>
           <a:prstGeom prst="rect">
@@ -4497,7 +4320,7 @@
         </p:nvSpPr>
         <p:spPr>
           <a:xfrm>
-            <a:off x="5480889" y="814711"/>
+            <a:off x="5107540" y="814711"/>
             <a:ext cx="471253" cy="246221"/>
           </a:xfrm>
           <a:prstGeom prst="rect">
@@ -4526,7 +4349,7 @@
         </p:nvSpPr>
         <p:spPr>
           <a:xfrm>
-            <a:off x="3591425" y="1447235"/>
+            <a:off x="3400654" y="1380427"/>
             <a:ext cx="324083" cy="198927"/>
           </a:xfrm>
           <a:prstGeom prst="rect">
@@ -4595,7 +4418,7 @@
         </p:nvSpPr>
         <p:spPr>
           <a:xfrm>
-            <a:off x="3879267" y="1447235"/>
+            <a:off x="3688496" y="1380427"/>
             <a:ext cx="1064715" cy="207749"/>
           </a:xfrm>
           <a:prstGeom prst="rect">

</xml_diff>

<commit_message>
Title casing components in for2py-architecture.pptx
</commit_message>
<xml_diff>
--- a/documentation/deliverable_reports/m5_final_phase1_report/for2py-architecture.pptx
+++ b/documentation/deliverable_reports/m5_final_phase1_report/for2py-architecture.pptx
@@ -154,7 +154,7 @@
           </a:lstStyle>
           <a:p>
             <a:r>
-              <a:rPr lang="en-US" smtClean="0"/>
+              <a:rPr lang="en-US"/>
               <a:t>Click to edit Master title style</a:t>
             </a:r>
             <a:endParaRPr lang="en-US" dirty="0"/>
@@ -219,7 +219,7 @@
           </a:lstStyle>
           <a:p>
             <a:r>
-              <a:rPr lang="en-US" smtClean="0"/>
+              <a:rPr lang="en-US"/>
               <a:t>Click to edit Master subtitle style</a:t>
             </a:r>
             <a:endParaRPr lang="en-US" dirty="0"/>
@@ -243,7 +243,7 @@
           <a:p>
             <a:fld id="{5E551C00-9195-45AD-A55D-BDDF21724D49}" type="datetimeFigureOut">
               <a:rPr lang="en-US" smtClean="0"/>
-              <a:t>3/27/2019</a:t>
+              <a:t>3/31/19</a:t>
             </a:fld>
             <a:endParaRPr lang="en-US"/>
           </a:p>
@@ -337,7 +337,7 @@
           <a:lstStyle/>
           <a:p>
             <a:r>
-              <a:rPr lang="en-US" smtClean="0"/>
+              <a:rPr lang="en-US"/>
               <a:t>Click to edit Master title style</a:t>
             </a:r>
             <a:endParaRPr lang="en-US" dirty="0"/>
@@ -361,35 +361,35 @@
           <a:p>
             <a:pPr lvl="0"/>
             <a:r>
-              <a:rPr lang="en-US" smtClean="0"/>
+              <a:rPr lang="en-US"/>
               <a:t>Edit Master text styles</a:t>
             </a:r>
           </a:p>
           <a:p>
             <a:pPr lvl="1"/>
             <a:r>
-              <a:rPr lang="en-US" smtClean="0"/>
+              <a:rPr lang="en-US"/>
               <a:t>Second level</a:t>
             </a:r>
           </a:p>
           <a:p>
             <a:pPr lvl="2"/>
             <a:r>
-              <a:rPr lang="en-US" smtClean="0"/>
+              <a:rPr lang="en-US"/>
               <a:t>Third level</a:t>
             </a:r>
           </a:p>
           <a:p>
             <a:pPr lvl="3"/>
             <a:r>
-              <a:rPr lang="en-US" smtClean="0"/>
+              <a:rPr lang="en-US"/>
               <a:t>Fourth level</a:t>
             </a:r>
           </a:p>
           <a:p>
             <a:pPr lvl="4"/>
             <a:r>
-              <a:rPr lang="en-US" smtClean="0"/>
+              <a:rPr lang="en-US"/>
               <a:t>Fifth level</a:t>
             </a:r>
             <a:endParaRPr lang="en-US" dirty="0"/>
@@ -413,7 +413,7 @@
           <a:p>
             <a:fld id="{5E551C00-9195-45AD-A55D-BDDF21724D49}" type="datetimeFigureOut">
               <a:rPr lang="en-US" smtClean="0"/>
-              <a:t>3/27/2019</a:t>
+              <a:t>3/31/19</a:t>
             </a:fld>
             <a:endParaRPr lang="en-US"/>
           </a:p>
@@ -512,7 +512,7 @@
           <a:lstStyle/>
           <a:p>
             <a:r>
-              <a:rPr lang="en-US" smtClean="0"/>
+              <a:rPr lang="en-US"/>
               <a:t>Click to edit Master title style</a:t>
             </a:r>
             <a:endParaRPr lang="en-US" dirty="0"/>
@@ -541,35 +541,35 @@
           <a:p>
             <a:pPr lvl="0"/>
             <a:r>
-              <a:rPr lang="en-US" smtClean="0"/>
+              <a:rPr lang="en-US"/>
               <a:t>Edit Master text styles</a:t>
             </a:r>
           </a:p>
           <a:p>
             <a:pPr lvl="1"/>
             <a:r>
-              <a:rPr lang="en-US" smtClean="0"/>
+              <a:rPr lang="en-US"/>
               <a:t>Second level</a:t>
             </a:r>
           </a:p>
           <a:p>
             <a:pPr lvl="2"/>
             <a:r>
-              <a:rPr lang="en-US" smtClean="0"/>
+              <a:rPr lang="en-US"/>
               <a:t>Third level</a:t>
             </a:r>
           </a:p>
           <a:p>
             <a:pPr lvl="3"/>
             <a:r>
-              <a:rPr lang="en-US" smtClean="0"/>
+              <a:rPr lang="en-US"/>
               <a:t>Fourth level</a:t>
             </a:r>
           </a:p>
           <a:p>
             <a:pPr lvl="4"/>
             <a:r>
-              <a:rPr lang="en-US" smtClean="0"/>
+              <a:rPr lang="en-US"/>
               <a:t>Fifth level</a:t>
             </a:r>
             <a:endParaRPr lang="en-US" dirty="0"/>
@@ -593,7 +593,7 @@
           <a:p>
             <a:fld id="{5E551C00-9195-45AD-A55D-BDDF21724D49}" type="datetimeFigureOut">
               <a:rPr lang="en-US" smtClean="0"/>
-              <a:t>3/27/2019</a:t>
+              <a:t>3/31/19</a:t>
             </a:fld>
             <a:endParaRPr lang="en-US"/>
           </a:p>
@@ -687,7 +687,7 @@
           <a:lstStyle/>
           <a:p>
             <a:r>
-              <a:rPr lang="en-US" smtClean="0"/>
+              <a:rPr lang="en-US"/>
               <a:t>Click to edit Master title style</a:t>
             </a:r>
             <a:endParaRPr lang="en-US" dirty="0"/>
@@ -711,35 +711,35 @@
           <a:p>
             <a:pPr lvl="0"/>
             <a:r>
-              <a:rPr lang="en-US" smtClean="0"/>
+              <a:rPr lang="en-US"/>
               <a:t>Edit Master text styles</a:t>
             </a:r>
           </a:p>
           <a:p>
             <a:pPr lvl="1"/>
             <a:r>
-              <a:rPr lang="en-US" smtClean="0"/>
+              <a:rPr lang="en-US"/>
               <a:t>Second level</a:t>
             </a:r>
           </a:p>
           <a:p>
             <a:pPr lvl="2"/>
             <a:r>
-              <a:rPr lang="en-US" smtClean="0"/>
+              <a:rPr lang="en-US"/>
               <a:t>Third level</a:t>
             </a:r>
           </a:p>
           <a:p>
             <a:pPr lvl="3"/>
             <a:r>
-              <a:rPr lang="en-US" smtClean="0"/>
+              <a:rPr lang="en-US"/>
               <a:t>Fourth level</a:t>
             </a:r>
           </a:p>
           <a:p>
             <a:pPr lvl="4"/>
             <a:r>
-              <a:rPr lang="en-US" smtClean="0"/>
+              <a:rPr lang="en-US"/>
               <a:t>Fifth level</a:t>
             </a:r>
             <a:endParaRPr lang="en-US" dirty="0"/>
@@ -763,7 +763,7 @@
           <a:p>
             <a:fld id="{5E551C00-9195-45AD-A55D-BDDF21724D49}" type="datetimeFigureOut">
               <a:rPr lang="en-US" smtClean="0"/>
-              <a:t>3/27/2019</a:t>
+              <a:t>3/31/19</a:t>
             </a:fld>
             <a:endParaRPr lang="en-US"/>
           </a:p>
@@ -866,7 +866,7 @@
           </a:lstStyle>
           <a:p>
             <a:r>
-              <a:rPr lang="en-US" smtClean="0"/>
+              <a:rPr lang="en-US"/>
               <a:t>Click to edit Master title style</a:t>
             </a:r>
             <a:endParaRPr lang="en-US" dirty="0"/>
@@ -986,7 +986,7 @@
           <a:p>
             <a:pPr lvl="0"/>
             <a:r>
-              <a:rPr lang="en-US" smtClean="0"/>
+              <a:rPr lang="en-US"/>
               <a:t>Edit Master text styles</a:t>
             </a:r>
           </a:p>
@@ -1009,7 +1009,7 @@
           <a:p>
             <a:fld id="{5E551C00-9195-45AD-A55D-BDDF21724D49}" type="datetimeFigureOut">
               <a:rPr lang="en-US" smtClean="0"/>
-              <a:t>3/27/2019</a:t>
+              <a:t>3/31/19</a:t>
             </a:fld>
             <a:endParaRPr lang="en-US"/>
           </a:p>
@@ -1103,7 +1103,7 @@
           <a:lstStyle/>
           <a:p>
             <a:r>
-              <a:rPr lang="en-US" smtClean="0"/>
+              <a:rPr lang="en-US"/>
               <a:t>Click to edit Master title style</a:t>
             </a:r>
             <a:endParaRPr lang="en-US" dirty="0"/>
@@ -1132,35 +1132,35 @@
           <a:p>
             <a:pPr lvl="0"/>
             <a:r>
-              <a:rPr lang="en-US" smtClean="0"/>
+              <a:rPr lang="en-US"/>
               <a:t>Edit Master text styles</a:t>
             </a:r>
           </a:p>
           <a:p>
             <a:pPr lvl="1"/>
             <a:r>
-              <a:rPr lang="en-US" smtClean="0"/>
+              <a:rPr lang="en-US"/>
               <a:t>Second level</a:t>
             </a:r>
           </a:p>
           <a:p>
             <a:pPr lvl="2"/>
             <a:r>
-              <a:rPr lang="en-US" smtClean="0"/>
+              <a:rPr lang="en-US"/>
               <a:t>Third level</a:t>
             </a:r>
           </a:p>
           <a:p>
             <a:pPr lvl="3"/>
             <a:r>
-              <a:rPr lang="en-US" smtClean="0"/>
+              <a:rPr lang="en-US"/>
               <a:t>Fourth level</a:t>
             </a:r>
           </a:p>
           <a:p>
             <a:pPr lvl="4"/>
             <a:r>
-              <a:rPr lang="en-US" smtClean="0"/>
+              <a:rPr lang="en-US"/>
               <a:t>Fifth level</a:t>
             </a:r>
             <a:endParaRPr lang="en-US" dirty="0"/>
@@ -1189,35 +1189,35 @@
           <a:p>
             <a:pPr lvl="0"/>
             <a:r>
-              <a:rPr lang="en-US" smtClean="0"/>
+              <a:rPr lang="en-US"/>
               <a:t>Edit Master text styles</a:t>
             </a:r>
           </a:p>
           <a:p>
             <a:pPr lvl="1"/>
             <a:r>
-              <a:rPr lang="en-US" smtClean="0"/>
+              <a:rPr lang="en-US"/>
               <a:t>Second level</a:t>
             </a:r>
           </a:p>
           <a:p>
             <a:pPr lvl="2"/>
             <a:r>
-              <a:rPr lang="en-US" smtClean="0"/>
+              <a:rPr lang="en-US"/>
               <a:t>Third level</a:t>
             </a:r>
           </a:p>
           <a:p>
             <a:pPr lvl="3"/>
             <a:r>
-              <a:rPr lang="en-US" smtClean="0"/>
+              <a:rPr lang="en-US"/>
               <a:t>Fourth level</a:t>
             </a:r>
           </a:p>
           <a:p>
             <a:pPr lvl="4"/>
             <a:r>
-              <a:rPr lang="en-US" smtClean="0"/>
+              <a:rPr lang="en-US"/>
               <a:t>Fifth level</a:t>
             </a:r>
             <a:endParaRPr lang="en-US" dirty="0"/>
@@ -1241,7 +1241,7 @@
           <a:p>
             <a:fld id="{5E551C00-9195-45AD-A55D-BDDF21724D49}" type="datetimeFigureOut">
               <a:rPr lang="en-US" smtClean="0"/>
-              <a:t>3/27/2019</a:t>
+              <a:t>3/31/19</a:t>
             </a:fld>
             <a:endParaRPr lang="en-US"/>
           </a:p>
@@ -1340,7 +1340,7 @@
           <a:lstStyle/>
           <a:p>
             <a:r>
-              <a:rPr lang="en-US" smtClean="0"/>
+              <a:rPr lang="en-US"/>
               <a:t>Click to edit Master title style</a:t>
             </a:r>
             <a:endParaRPr lang="en-US" dirty="0"/>
@@ -1406,7 +1406,7 @@
           <a:p>
             <a:pPr lvl="0"/>
             <a:r>
-              <a:rPr lang="en-US" smtClean="0"/>
+              <a:rPr lang="en-US"/>
               <a:t>Edit Master text styles</a:t>
             </a:r>
           </a:p>
@@ -1434,35 +1434,35 @@
           <a:p>
             <a:pPr lvl="0"/>
             <a:r>
-              <a:rPr lang="en-US" smtClean="0"/>
+              <a:rPr lang="en-US"/>
               <a:t>Edit Master text styles</a:t>
             </a:r>
           </a:p>
           <a:p>
             <a:pPr lvl="1"/>
             <a:r>
-              <a:rPr lang="en-US" smtClean="0"/>
+              <a:rPr lang="en-US"/>
               <a:t>Second level</a:t>
             </a:r>
           </a:p>
           <a:p>
             <a:pPr lvl="2"/>
             <a:r>
-              <a:rPr lang="en-US" smtClean="0"/>
+              <a:rPr lang="en-US"/>
               <a:t>Third level</a:t>
             </a:r>
           </a:p>
           <a:p>
             <a:pPr lvl="3"/>
             <a:r>
-              <a:rPr lang="en-US" smtClean="0"/>
+              <a:rPr lang="en-US"/>
               <a:t>Fourth level</a:t>
             </a:r>
           </a:p>
           <a:p>
             <a:pPr lvl="4"/>
             <a:r>
-              <a:rPr lang="en-US" smtClean="0"/>
+              <a:rPr lang="en-US"/>
               <a:t>Fifth level</a:t>
             </a:r>
             <a:endParaRPr lang="en-US" dirty="0"/>
@@ -1528,7 +1528,7 @@
           <a:p>
             <a:pPr lvl="0"/>
             <a:r>
-              <a:rPr lang="en-US" smtClean="0"/>
+              <a:rPr lang="en-US"/>
               <a:t>Edit Master text styles</a:t>
             </a:r>
           </a:p>
@@ -1556,35 +1556,35 @@
           <a:p>
             <a:pPr lvl="0"/>
             <a:r>
-              <a:rPr lang="en-US" smtClean="0"/>
+              <a:rPr lang="en-US"/>
               <a:t>Edit Master text styles</a:t>
             </a:r>
           </a:p>
           <a:p>
             <a:pPr lvl="1"/>
             <a:r>
-              <a:rPr lang="en-US" smtClean="0"/>
+              <a:rPr lang="en-US"/>
               <a:t>Second level</a:t>
             </a:r>
           </a:p>
           <a:p>
             <a:pPr lvl="2"/>
             <a:r>
-              <a:rPr lang="en-US" smtClean="0"/>
+              <a:rPr lang="en-US"/>
               <a:t>Third level</a:t>
             </a:r>
           </a:p>
           <a:p>
             <a:pPr lvl="3"/>
             <a:r>
-              <a:rPr lang="en-US" smtClean="0"/>
+              <a:rPr lang="en-US"/>
               <a:t>Fourth level</a:t>
             </a:r>
           </a:p>
           <a:p>
             <a:pPr lvl="4"/>
             <a:r>
-              <a:rPr lang="en-US" smtClean="0"/>
+              <a:rPr lang="en-US"/>
               <a:t>Fifth level</a:t>
             </a:r>
             <a:endParaRPr lang="en-US" dirty="0"/>
@@ -1608,7 +1608,7 @@
           <a:p>
             <a:fld id="{5E551C00-9195-45AD-A55D-BDDF21724D49}" type="datetimeFigureOut">
               <a:rPr lang="en-US" smtClean="0"/>
-              <a:t>3/27/2019</a:t>
+              <a:t>3/31/19</a:t>
             </a:fld>
             <a:endParaRPr lang="en-US"/>
           </a:p>
@@ -1702,7 +1702,7 @@
           <a:lstStyle/>
           <a:p>
             <a:r>
-              <a:rPr lang="en-US" smtClean="0"/>
+              <a:rPr lang="en-US"/>
               <a:t>Click to edit Master title style</a:t>
             </a:r>
             <a:endParaRPr lang="en-US" dirty="0"/>
@@ -1726,7 +1726,7 @@
           <a:p>
             <a:fld id="{5E551C00-9195-45AD-A55D-BDDF21724D49}" type="datetimeFigureOut">
               <a:rPr lang="en-US" smtClean="0"/>
-              <a:t>3/27/2019</a:t>
+              <a:t>3/31/19</a:t>
             </a:fld>
             <a:endParaRPr lang="en-US"/>
           </a:p>
@@ -1821,7 +1821,7 @@
           <a:p>
             <a:fld id="{5E551C00-9195-45AD-A55D-BDDF21724D49}" type="datetimeFigureOut">
               <a:rPr lang="en-US" smtClean="0"/>
-              <a:t>3/27/2019</a:t>
+              <a:t>3/31/19</a:t>
             </a:fld>
             <a:endParaRPr lang="en-US"/>
           </a:p>
@@ -1924,7 +1924,7 @@
           </a:lstStyle>
           <a:p>
             <a:r>
-              <a:rPr lang="en-US" smtClean="0"/>
+              <a:rPr lang="en-US"/>
               <a:t>Click to edit Master title style</a:t>
             </a:r>
             <a:endParaRPr lang="en-US" dirty="0"/>
@@ -1981,35 +1981,35 @@
           <a:p>
             <a:pPr lvl="0"/>
             <a:r>
-              <a:rPr lang="en-US" smtClean="0"/>
+              <a:rPr lang="en-US"/>
               <a:t>Edit Master text styles</a:t>
             </a:r>
           </a:p>
           <a:p>
             <a:pPr lvl="1"/>
             <a:r>
-              <a:rPr lang="en-US" smtClean="0"/>
+              <a:rPr lang="en-US"/>
               <a:t>Second level</a:t>
             </a:r>
           </a:p>
           <a:p>
             <a:pPr lvl="2"/>
             <a:r>
-              <a:rPr lang="en-US" smtClean="0"/>
+              <a:rPr lang="en-US"/>
               <a:t>Third level</a:t>
             </a:r>
           </a:p>
           <a:p>
             <a:pPr lvl="3"/>
             <a:r>
-              <a:rPr lang="en-US" smtClean="0"/>
+              <a:rPr lang="en-US"/>
               <a:t>Fourth level</a:t>
             </a:r>
           </a:p>
           <a:p>
             <a:pPr lvl="4"/>
             <a:r>
-              <a:rPr lang="en-US" smtClean="0"/>
+              <a:rPr lang="en-US"/>
               <a:t>Fifth level</a:t>
             </a:r>
             <a:endParaRPr lang="en-US" dirty="0"/>
@@ -2075,7 +2075,7 @@
           <a:p>
             <a:pPr lvl="0"/>
             <a:r>
-              <a:rPr lang="en-US" smtClean="0"/>
+              <a:rPr lang="en-US"/>
               <a:t>Edit Master text styles</a:t>
             </a:r>
           </a:p>
@@ -2098,7 +2098,7 @@
           <a:p>
             <a:fld id="{5E551C00-9195-45AD-A55D-BDDF21724D49}" type="datetimeFigureOut">
               <a:rPr lang="en-US" smtClean="0"/>
-              <a:t>3/27/2019</a:t>
+              <a:t>3/31/19</a:t>
             </a:fld>
             <a:endParaRPr lang="en-US"/>
           </a:p>
@@ -2201,7 +2201,7 @@
           </a:lstStyle>
           <a:p>
             <a:r>
-              <a:rPr lang="en-US" smtClean="0"/>
+              <a:rPr lang="en-US"/>
               <a:t>Click to edit Master title style</a:t>
             </a:r>
             <a:endParaRPr lang="en-US" dirty="0"/>
@@ -2266,7 +2266,7 @@
           </a:lstStyle>
           <a:p>
             <a:r>
-              <a:rPr lang="en-US" smtClean="0"/>
+              <a:rPr lang="en-US"/>
               <a:t>Click icon to add picture</a:t>
             </a:r>
             <a:endParaRPr lang="en-US" dirty="0"/>
@@ -2332,7 +2332,7 @@
           <a:p>
             <a:pPr lvl="0"/>
             <a:r>
-              <a:rPr lang="en-US" smtClean="0"/>
+              <a:rPr lang="en-US"/>
               <a:t>Edit Master text styles</a:t>
             </a:r>
           </a:p>
@@ -2355,7 +2355,7 @@
           <a:p>
             <a:fld id="{5E551C00-9195-45AD-A55D-BDDF21724D49}" type="datetimeFigureOut">
               <a:rPr lang="en-US" smtClean="0"/>
-              <a:t>3/27/2019</a:t>
+              <a:t>3/31/19</a:t>
             </a:fld>
             <a:endParaRPr lang="en-US"/>
           </a:p>
@@ -2464,7 +2464,7 @@
           <a:lstStyle/>
           <a:p>
             <a:r>
-              <a:rPr lang="en-US" smtClean="0"/>
+              <a:rPr lang="en-US"/>
               <a:t>Click to edit Master title style</a:t>
             </a:r>
             <a:endParaRPr lang="en-US" dirty="0"/>
@@ -2498,35 +2498,35 @@
           <a:p>
             <a:pPr lvl="0"/>
             <a:r>
-              <a:rPr lang="en-US" smtClean="0"/>
+              <a:rPr lang="en-US"/>
               <a:t>Edit Master text styles</a:t>
             </a:r>
           </a:p>
           <a:p>
             <a:pPr lvl="1"/>
             <a:r>
-              <a:rPr lang="en-US" smtClean="0"/>
+              <a:rPr lang="en-US"/>
               <a:t>Second level</a:t>
             </a:r>
           </a:p>
           <a:p>
             <a:pPr lvl="2"/>
             <a:r>
-              <a:rPr lang="en-US" smtClean="0"/>
+              <a:rPr lang="en-US"/>
               <a:t>Third level</a:t>
             </a:r>
           </a:p>
           <a:p>
             <a:pPr lvl="3"/>
             <a:r>
-              <a:rPr lang="en-US" smtClean="0"/>
+              <a:rPr lang="en-US"/>
               <a:t>Fourth level</a:t>
             </a:r>
           </a:p>
           <a:p>
             <a:pPr lvl="4"/>
             <a:r>
-              <a:rPr lang="en-US" smtClean="0"/>
+              <a:rPr lang="en-US"/>
               <a:t>Fifth level</a:t>
             </a:r>
             <a:endParaRPr lang="en-US" dirty="0"/>
@@ -2568,7 +2568,7 @@
           <a:p>
             <a:fld id="{5E551C00-9195-45AD-A55D-BDDF21724D49}" type="datetimeFigureOut">
               <a:rPr lang="en-US" smtClean="0"/>
-              <a:t>3/27/2019</a:t>
+              <a:t>3/31/19</a:t>
             </a:fld>
             <a:endParaRPr lang="en-US"/>
           </a:p>
@@ -3021,18 +3021,13 @@
           <a:p>
             <a:pPr algn="ctr"/>
             <a:r>
-              <a:rPr lang="en-US" sz="850" dirty="0" smtClean="0">
+              <a:rPr lang="en-US" sz="850" dirty="0">
                 <a:solidFill>
                   <a:schemeClr val="tx1"/>
                 </a:solidFill>
               </a:rPr>
-              <a:t>preprocessor</a:t>
-            </a:r>
-            <a:endParaRPr lang="en-US" sz="850" dirty="0">
-              <a:solidFill>
-                <a:schemeClr val="tx1"/>
-              </a:solidFill>
-            </a:endParaRPr>
+              <a:t>Preprocessor</a:t>
+            </a:r>
           </a:p>
         </p:txBody>
       </p:sp>
@@ -3098,7 +3093,7 @@
               </a:lnSpc>
             </a:pPr>
             <a:r>
-              <a:rPr lang="en-US" sz="850" dirty="0" smtClean="0">
+              <a:rPr lang="en-US" sz="850" dirty="0">
                 <a:solidFill>
                   <a:schemeClr val="tx1"/>
                 </a:solidFill>
@@ -3113,7 +3108,7 @@
               </a:lnSpc>
             </a:pPr>
             <a:r>
-              <a:rPr lang="en-US" sz="850" dirty="0" smtClean="0">
+              <a:rPr lang="en-US" sz="850" dirty="0">
                 <a:solidFill>
                   <a:schemeClr val="tx1"/>
                 </a:solidFill>
@@ -3128,18 +3123,13 @@
               </a:lnSpc>
             </a:pPr>
             <a:r>
-              <a:rPr lang="en-US" sz="850" dirty="0" smtClean="0">
+              <a:rPr lang="en-US" sz="850" dirty="0">
                 <a:solidFill>
                   <a:schemeClr val="tx1"/>
                 </a:solidFill>
               </a:rPr>
               <a:t>parser (OFP)</a:t>
             </a:r>
-            <a:endParaRPr lang="en-US" sz="850" dirty="0">
-              <a:solidFill>
-                <a:schemeClr val="tx1"/>
-              </a:solidFill>
-            </a:endParaRPr>
           </a:p>
         </p:txBody>
       </p:sp>
@@ -3191,18 +3181,13 @@
           <a:p>
             <a:pPr algn="ctr"/>
             <a:r>
-              <a:rPr lang="en-US" sz="850" dirty="0" smtClean="0">
+              <a:rPr lang="en-US" sz="850" dirty="0">
                 <a:solidFill>
                   <a:schemeClr val="tx1"/>
                 </a:solidFill>
               </a:rPr>
               <a:t>AST transformer </a:t>
             </a:r>
-            <a:endParaRPr lang="en-US" sz="850" dirty="0">
-              <a:solidFill>
-                <a:schemeClr val="tx1"/>
-              </a:solidFill>
-            </a:endParaRPr>
           </a:p>
         </p:txBody>
       </p:sp>
@@ -3254,18 +3239,13 @@
           <a:p>
             <a:pPr algn="ctr"/>
             <a:r>
-              <a:rPr lang="en-US" sz="850" dirty="0" smtClean="0">
+              <a:rPr lang="en-US" sz="850" dirty="0">
                 <a:solidFill>
                   <a:schemeClr val="tx1"/>
                 </a:solidFill>
               </a:rPr>
               <a:t>AST to IR lifter </a:t>
             </a:r>
-            <a:endParaRPr lang="en-US" sz="850" dirty="0">
-              <a:solidFill>
-                <a:schemeClr val="tx1"/>
-              </a:solidFill>
-            </a:endParaRPr>
           </a:p>
         </p:txBody>
       </p:sp>
@@ -3317,7 +3297,7 @@
           <a:p>
             <a:pPr algn="ctr"/>
             <a:r>
-              <a:rPr lang="en-US" sz="850" dirty="0" smtClean="0">
+              <a:rPr lang="en-US" sz="850" dirty="0">
                 <a:solidFill>
                   <a:schemeClr val="tx1"/>
                 </a:solidFill>
@@ -3325,7 +3305,7 @@
               <a:t>IR to </a:t>
             </a:r>
             <a:r>
-              <a:rPr lang="en-US" sz="850" dirty="0" err="1" smtClean="0">
+              <a:rPr lang="en-US" sz="850" dirty="0" err="1">
                 <a:solidFill>
                   <a:schemeClr val="tx1"/>
                 </a:solidFill>
@@ -3333,18 +3313,13 @@
               <a:t>GrFN</a:t>
             </a:r>
             <a:r>
-              <a:rPr lang="en-US" sz="850" dirty="0" smtClean="0">
+              <a:rPr lang="en-US" sz="850" dirty="0">
                 <a:solidFill>
                   <a:schemeClr val="tx1"/>
                 </a:solidFill>
               </a:rPr>
               <a:t> transformer</a:t>
             </a:r>
-            <a:endParaRPr lang="en-US" sz="850" dirty="0">
-              <a:solidFill>
-                <a:schemeClr val="tx1"/>
-              </a:solidFill>
-            </a:endParaRPr>
           </a:p>
         </p:txBody>
       </p:sp>
@@ -3551,29 +3526,24 @@
           <a:p>
             <a:pPr algn="ctr"/>
             <a:r>
-              <a:rPr lang="en-US" sz="850" dirty="0" smtClean="0">
+              <a:rPr lang="en-US" sz="850" dirty="0">
                 <a:solidFill>
                   <a:schemeClr val="tx1"/>
                 </a:solidFill>
               </a:rPr>
-              <a:t>comment</a:t>
+              <a:t>Comment</a:t>
             </a:r>
           </a:p>
           <a:p>
             <a:pPr algn="ctr"/>
             <a:r>
-              <a:rPr lang="en-US" sz="850" dirty="0" smtClean="0">
+              <a:rPr lang="en-US" sz="850" dirty="0">
                 <a:solidFill>
                   <a:schemeClr val="tx1"/>
                 </a:solidFill>
               </a:rPr>
               <a:t>processor</a:t>
             </a:r>
-            <a:endParaRPr lang="en-US" sz="850" dirty="0">
-              <a:solidFill>
-                <a:schemeClr val="tx1"/>
-              </a:solidFill>
-            </a:endParaRPr>
           </a:p>
         </p:txBody>
       </p:sp>
@@ -3600,16 +3570,15 @@
           <a:lstStyle/>
           <a:p>
             <a:r>
-              <a:rPr lang="en-US" sz="1000" dirty="0" smtClean="0"/>
-              <a:t>source</a:t>
-            </a:r>
-          </a:p>
-          <a:p>
-            <a:r>
-              <a:rPr lang="en-US" sz="1000" dirty="0" smtClean="0"/>
+              <a:rPr lang="en-US" sz="1000" dirty="0"/>
+              <a:t>Source</a:t>
+            </a:r>
+          </a:p>
+          <a:p>
+            <a:r>
+              <a:rPr lang="en-US" sz="1000" dirty="0"/>
               <a:t>code</a:t>
             </a:r>
-            <a:endParaRPr lang="en-US" sz="1000" dirty="0"/>
           </a:p>
         </p:txBody>
       </p:sp>
@@ -3904,17 +3873,16 @@
           <a:p>
             <a:pPr algn="ctr"/>
             <a:r>
-              <a:rPr lang="en-US" sz="750" dirty="0" smtClean="0"/>
+              <a:rPr lang="en-US" sz="750" dirty="0"/>
               <a:t>Comments</a:t>
             </a:r>
           </a:p>
           <a:p>
             <a:pPr algn="ctr"/>
             <a:r>
-              <a:rPr lang="en-US" sz="750" dirty="0" smtClean="0"/>
+              <a:rPr lang="en-US" sz="750" dirty="0"/>
               <a:t>(Python objects)</a:t>
             </a:r>
-            <a:endParaRPr lang="en-US" sz="750" dirty="0"/>
           </a:p>
         </p:txBody>
       </p:sp>
@@ -3942,7 +3910,7 @@
           <a:p>
             <a:pPr algn="ctr"/>
             <a:r>
-              <a:rPr lang="en-US" sz="750" dirty="0" smtClean="0"/>
+              <a:rPr lang="en-US" sz="750" dirty="0"/>
               <a:t>Preprocessed source code</a:t>
             </a:r>
           </a:p>
@@ -4011,10 +3979,9 @@
           <a:p>
             <a:pPr algn="ctr"/>
             <a:r>
-              <a:rPr lang="en-US" sz="750" dirty="0" smtClean="0"/>
+              <a:rPr lang="en-US" sz="750" dirty="0"/>
               <a:t>AST (XML)</a:t>
             </a:r>
-            <a:endParaRPr lang="en-US" sz="750" dirty="0"/>
           </a:p>
         </p:txBody>
       </p:sp>
@@ -4081,15 +4048,15 @@
           <a:p>
             <a:pPr algn="ctr"/>
             <a:r>
-              <a:rPr lang="en-US" sz="750" dirty="0" err="1" smtClean="0"/>
+              <a:rPr lang="en-US" sz="750" dirty="0" err="1"/>
               <a:t>AST+comments</a:t>
             </a:r>
-            <a:endParaRPr lang="en-US" sz="750" dirty="0" smtClean="0"/>
+            <a:endParaRPr lang="en-US" sz="750" dirty="0"/>
           </a:p>
           <a:p>
             <a:pPr algn="ctr"/>
             <a:r>
-              <a:rPr lang="en-US" sz="750" dirty="0" smtClean="0"/>
+              <a:rPr lang="en-US" sz="750" dirty="0"/>
               <a:t>(Python objects)</a:t>
             </a:r>
           </a:p>
@@ -4158,14 +4125,14 @@
           <a:p>
             <a:pPr algn="ctr"/>
             <a:r>
-              <a:rPr lang="en-US" sz="750" dirty="0" smtClean="0"/>
+              <a:rPr lang="en-US" sz="750" dirty="0"/>
               <a:t>IR</a:t>
             </a:r>
           </a:p>
           <a:p>
             <a:pPr algn="ctr"/>
             <a:r>
-              <a:rPr lang="en-US" sz="750" dirty="0" smtClean="0"/>
+              <a:rPr lang="en-US" sz="750" dirty="0"/>
               <a:t>(Python objects)</a:t>
             </a:r>
           </a:p>
@@ -4305,10 +4272,10 @@
           <a:lstStyle/>
           <a:p>
             <a:r>
-              <a:rPr lang="en-US" sz="1000" dirty="0" err="1" smtClean="0"/>
+              <a:rPr lang="en-US" sz="1000" dirty="0" err="1"/>
               <a:t>GrFN</a:t>
             </a:r>
-            <a:endParaRPr lang="en-US" sz="1000" dirty="0" smtClean="0"/>
+            <a:endParaRPr lang="en-US" sz="1000" dirty="0"/>
           </a:p>
         </p:txBody>
       </p:sp>
@@ -4335,7 +4302,7 @@
           <a:lstStyle/>
           <a:p>
             <a:r>
-              <a:rPr lang="en-US" sz="1000" dirty="0" smtClean="0"/>
+              <a:rPr lang="en-US" sz="1000" dirty="0"/>
               <a:t>lambdas</a:t>
             </a:r>
           </a:p>
@@ -4433,10 +4400,9 @@
           <a:lstStyle/>
           <a:p>
             <a:r>
-              <a:rPr lang="en-US" sz="750" dirty="0" smtClean="0"/>
+              <a:rPr lang="en-US" sz="750" dirty="0"/>
               <a:t>:  Third-party software</a:t>
             </a:r>
-            <a:endParaRPr lang="en-US" sz="750" dirty="0"/>
           </a:p>
         </p:txBody>
       </p:sp>

</xml_diff>